<commit_message>
doc: add todos for exercise 3
</commit_message>
<xml_diff>
--- a/Wireframe.pptx
+++ b/Wireframe.pptx
@@ -6,6 +6,7 @@
   </p:sldMasterIdLst>
   <p:sldIdLst>
     <p:sldId id="256" r:id="rId2"/>
+    <p:sldId id="257" r:id="rId3"/>
   </p:sldIdLst>
   <p:sldSz cx="12192000" cy="6858000"/>
   <p:notesSz cx="6858000" cy="9144000"/>
@@ -110,6 +111,11 @@
         <p14:section name="Liste" id="{11A708CA-1EB1-4099-AC34-67DAA9E7BA22}">
           <p14:sldIdLst>
             <p14:sldId id="256"/>
+          </p14:sldIdLst>
+        </p14:section>
+        <p14:section name="Liste ohne Elemente" id="{9F6CB6F2-6B63-4573-B4B1-2AE50E0312EC}">
+          <p14:sldIdLst>
+            <p14:sldId id="257"/>
           </p14:sldIdLst>
         </p14:section>
       </p14:sectionLst>
@@ -3452,6 +3458,175 @@
 </p:sld>
 </file>
 
+<file path=ppt/slides/slide2.xml><?xml version="1.0" encoding="utf-8"?>
+<p:sld xmlns:a="http://schemas.openxmlformats.org/drawingml/2006/main" xmlns:r="http://schemas.openxmlformats.org/officeDocument/2006/relationships" xmlns:p="http://schemas.openxmlformats.org/presentationml/2006/main">
+  <p:cSld>
+    <p:spTree>
+      <p:nvGrpSpPr>
+        <p:cNvPr id="1" name=""/>
+        <p:cNvGrpSpPr/>
+        <p:nvPr/>
+      </p:nvGrpSpPr>
+      <p:grpSpPr>
+        <a:xfrm>
+          <a:off x="0" y="0"/>
+          <a:ext cx="0" cy="0"/>
+          <a:chOff x="0" y="0"/>
+          <a:chExt cx="0" cy="0"/>
+        </a:xfrm>
+      </p:grpSpPr>
+      <p:sp>
+        <p:nvSpPr>
+          <p:cNvPr id="4" name="Textfeld 3"/>
+          <p:cNvSpPr txBox="1"/>
+          <p:nvPr/>
+        </p:nvSpPr>
+        <p:spPr>
+          <a:xfrm>
+            <a:off x="3021725" y="0"/>
+            <a:ext cx="6148551" cy="523220"/>
+          </a:xfrm>
+          <a:prstGeom prst="rect">
+            <a:avLst/>
+          </a:prstGeom>
+          <a:noFill/>
+        </p:spPr>
+        <p:txBody>
+          <a:bodyPr wrap="square" rtlCol="0">
+            <a:spAutoFit/>
+          </a:bodyPr>
+          <a:lstStyle/>
+          <a:p>
+            <a:pPr algn="ctr"/>
+            <a:r>
+              <a:rPr lang="de-DE" sz="2800" dirty="0" smtClean="0">
+                <a:latin typeface="Segoe UI" panose="020B0502040204020203" pitchFamily="34" charset="0"/>
+                <a:cs typeface="Segoe UI" panose="020B0502040204020203" pitchFamily="34" charset="0"/>
+              </a:rPr>
+              <a:t>Meine kleine Bibliothek</a:t>
+            </a:r>
+            <a:endParaRPr lang="de-DE" sz="2800" dirty="0">
+              <a:latin typeface="Segoe UI" panose="020B0502040204020203" pitchFamily="34" charset="0"/>
+              <a:cs typeface="Segoe UI" panose="020B0502040204020203" pitchFamily="34" charset="0"/>
+            </a:endParaRPr>
+          </a:p>
+        </p:txBody>
+      </p:sp>
+      <p:sp>
+        <p:nvSpPr>
+          <p:cNvPr id="12" name="Abgerundetes Rechteck 11"/>
+          <p:cNvSpPr/>
+          <p:nvPr/>
+        </p:nvSpPr>
+        <p:spPr>
+          <a:xfrm>
+            <a:off x="588579" y="1112231"/>
+            <a:ext cx="11014841" cy="599090"/>
+          </a:xfrm>
+          <a:prstGeom prst="roundRect">
+            <a:avLst/>
+          </a:prstGeom>
+          <a:solidFill>
+            <a:srgbClr val="9AC2E6"/>
+          </a:solidFill>
+        </p:spPr>
+        <p:style>
+          <a:lnRef idx="2">
+            <a:schemeClr val="accent1">
+              <a:shade val="50000"/>
+            </a:schemeClr>
+          </a:lnRef>
+          <a:fillRef idx="1">
+            <a:schemeClr val="accent1"/>
+          </a:fillRef>
+          <a:effectRef idx="0">
+            <a:schemeClr val="accent1"/>
+          </a:effectRef>
+          <a:fontRef idx="minor">
+            <a:schemeClr val="lt1"/>
+          </a:fontRef>
+        </p:style>
+        <p:txBody>
+          <a:bodyPr rtlCol="0" anchor="ctr"/>
+          <a:lstStyle/>
+          <a:p>
+            <a:pPr algn="ctr"/>
+            <a:r>
+              <a:rPr lang="de-DE" sz="2400" dirty="0" smtClean="0">
+                <a:solidFill>
+                  <a:schemeClr val="tx1"/>
+                </a:solidFill>
+              </a:rPr>
+              <a:t>Es sind noch keine Bücher vorhanden</a:t>
+            </a:r>
+            <a:endParaRPr lang="de-DE" sz="2400" dirty="0">
+              <a:solidFill>
+                <a:schemeClr val="tx1"/>
+              </a:solidFill>
+            </a:endParaRPr>
+          </a:p>
+        </p:txBody>
+      </p:sp>
+      <p:sp>
+        <p:nvSpPr>
+          <p:cNvPr id="14" name="Textfeld 13"/>
+          <p:cNvSpPr txBox="1"/>
+          <p:nvPr/>
+        </p:nvSpPr>
+        <p:spPr>
+          <a:xfrm>
+            <a:off x="3836276" y="6348248"/>
+            <a:ext cx="4519448" cy="369332"/>
+          </a:xfrm>
+          <a:prstGeom prst="rect">
+            <a:avLst/>
+          </a:prstGeom>
+          <a:noFill/>
+        </p:spPr>
+        <p:txBody>
+          <a:bodyPr wrap="square" rtlCol="0">
+            <a:spAutoFit/>
+          </a:bodyPr>
+          <a:lstStyle/>
+          <a:p>
+            <a:pPr algn="ctr"/>
+            <a:r>
+              <a:rPr lang="de-DE" dirty="0" smtClean="0"/>
+              <a:t>© 2022 </a:t>
+            </a:r>
+            <a:r>
+              <a:rPr lang="de-DE" dirty="0" err="1" smtClean="0"/>
+              <a:t>by</a:t>
+            </a:r>
+            <a:r>
+              <a:rPr lang="de-DE" dirty="0" smtClean="0"/>
+              <a:t> </a:t>
+            </a:r>
+            <a:r>
+              <a:rPr lang="de-DE" dirty="0" err="1" smtClean="0"/>
+              <a:t>me</a:t>
+            </a:r>
+            <a:r>
+              <a:rPr lang="de-DE" dirty="0" smtClean="0"/>
+              <a:t> :)</a:t>
+            </a:r>
+            <a:endParaRPr lang="de-DE" dirty="0"/>
+          </a:p>
+        </p:txBody>
+      </p:sp>
+    </p:spTree>
+    <p:extLst>
+      <p:ext uri="{BB962C8B-B14F-4D97-AF65-F5344CB8AC3E}">
+        <p14:creationId xmlns:p14="http://schemas.microsoft.com/office/powerpoint/2010/main" val="3003094754"/>
+      </p:ext>
+    </p:extLst>
+  </p:cSld>
+  <p:clrMapOvr>
+    <a:masterClrMapping/>
+  </p:clrMapOvr>
+</p:sld>
+</file>
+
 <file path=ppt/theme/theme1.xml><?xml version="1.0" encoding="utf-8"?>
 <a:theme xmlns:a="http://schemas.openxmlformats.org/drawingml/2006/main" name="Office">
   <a:themeElements>

</xml_diff>

<commit_message>
doc: add todos for exercise 4
</commit_message>
<xml_diff>
--- a/Wireframe.pptx
+++ b/Wireframe.pptx
@@ -7,6 +7,7 @@
   <p:sldIdLst>
     <p:sldId id="256" r:id="rId2"/>
     <p:sldId id="257" r:id="rId3"/>
+    <p:sldId id="258" r:id="rId4"/>
   </p:sldIdLst>
   <p:sldSz cx="12192000" cy="6858000"/>
   <p:notesSz cx="6858000" cy="9144000"/>
@@ -116,6 +117,11 @@
         <p14:section name="Liste ohne Elemente" id="{9F6CB6F2-6B63-4573-B4B1-2AE50E0312EC}">
           <p14:sldIdLst>
             <p14:sldId id="257"/>
+          </p14:sldIdLst>
+        </p14:section>
+        <p14:section name="Formular" id="{E7E41AC1-0EC0-4E2A-A325-79378982ECFC}">
+          <p14:sldIdLst>
+            <p14:sldId id="258"/>
           </p14:sldIdLst>
         </p14:section>
       </p14:sectionLst>
@@ -3026,7 +3032,7 @@
         </p:nvSpPr>
         <p:spPr>
           <a:xfrm>
-            <a:off x="588580" y="704193"/>
+            <a:off x="672663" y="1489229"/>
             <a:ext cx="11014841" cy="599090"/>
           </a:xfrm>
           <a:prstGeom prst="roundRect">
@@ -3080,7 +3086,7 @@
         </p:nvSpPr>
         <p:spPr>
           <a:xfrm>
-            <a:off x="8849711" y="803683"/>
+            <a:off x="8933794" y="1588719"/>
             <a:ext cx="2753710" cy="400110"/>
           </a:xfrm>
           <a:prstGeom prst="rect">
@@ -3119,7 +3125,7 @@
         </p:nvSpPr>
         <p:spPr>
           <a:xfrm>
-            <a:off x="588580" y="1402773"/>
+            <a:off x="672663" y="2187809"/>
             <a:ext cx="11014841" cy="599090"/>
           </a:xfrm>
           <a:prstGeom prst="roundRect">
@@ -3173,7 +3179,7 @@
         </p:nvSpPr>
         <p:spPr>
           <a:xfrm>
-            <a:off x="8849711" y="1502263"/>
+            <a:off x="8933794" y="2287299"/>
             <a:ext cx="2753710" cy="400110"/>
           </a:xfrm>
           <a:prstGeom prst="rect">
@@ -3216,7 +3222,7 @@
         </p:nvSpPr>
         <p:spPr>
           <a:xfrm>
-            <a:off x="588580" y="2101353"/>
+            <a:off x="672663" y="2886389"/>
             <a:ext cx="11014841" cy="599090"/>
           </a:xfrm>
           <a:prstGeom prst="roundRect">
@@ -3270,7 +3276,7 @@
         </p:nvSpPr>
         <p:spPr>
           <a:xfrm>
-            <a:off x="8849711" y="2200843"/>
+            <a:off x="8933794" y="2985879"/>
             <a:ext cx="2753710" cy="400110"/>
           </a:xfrm>
           <a:prstGeom prst="rect">
@@ -3309,7 +3315,7 @@
         </p:nvSpPr>
         <p:spPr>
           <a:xfrm>
-            <a:off x="588580" y="2799933"/>
+            <a:off x="672663" y="3584969"/>
             <a:ext cx="11014841" cy="599090"/>
           </a:xfrm>
           <a:prstGeom prst="roundRect">
@@ -3363,7 +3369,7 @@
         </p:nvSpPr>
         <p:spPr>
           <a:xfrm>
-            <a:off x="8849711" y="2899423"/>
+            <a:off x="8933794" y="3684459"/>
             <a:ext cx="2753710" cy="400110"/>
           </a:xfrm>
           <a:prstGeom prst="rect">
@@ -3442,6 +3448,64 @@
               <a:t> :)</a:t>
             </a:r>
             <a:endParaRPr lang="de-DE" dirty="0"/>
+          </a:p>
+        </p:txBody>
+      </p:sp>
+      <p:sp>
+        <p:nvSpPr>
+          <p:cNvPr id="15" name="Abgerundetes Rechteck 14"/>
+          <p:cNvSpPr/>
+          <p:nvPr/>
+        </p:nvSpPr>
+        <p:spPr>
+          <a:xfrm>
+            <a:off x="672663" y="811897"/>
+            <a:ext cx="1818289" cy="365262"/>
+          </a:xfrm>
+          <a:prstGeom prst="roundRect">
+            <a:avLst/>
+          </a:prstGeom>
+          <a:solidFill>
+            <a:schemeClr val="accent6">
+              <a:lumMod val="60000"/>
+              <a:lumOff val="40000"/>
+            </a:schemeClr>
+          </a:solidFill>
+        </p:spPr>
+        <p:style>
+          <a:lnRef idx="2">
+            <a:schemeClr val="accent1">
+              <a:shade val="50000"/>
+            </a:schemeClr>
+          </a:lnRef>
+          <a:fillRef idx="1">
+            <a:schemeClr val="accent1"/>
+          </a:fillRef>
+          <a:effectRef idx="0">
+            <a:schemeClr val="accent1"/>
+          </a:effectRef>
+          <a:fontRef idx="minor">
+            <a:schemeClr val="lt1"/>
+          </a:fontRef>
+        </p:style>
+        <p:txBody>
+          <a:bodyPr rtlCol="0" anchor="ctr"/>
+          <a:lstStyle/>
+          <a:p>
+            <a:pPr algn="ctr"/>
+            <a:r>
+              <a:rPr lang="de-DE" dirty="0" smtClean="0">
+                <a:solidFill>
+                  <a:schemeClr val="tx1"/>
+                </a:solidFill>
+              </a:rPr>
+              <a:t>Buch hinzufügen</a:t>
+            </a:r>
+            <a:endParaRPr lang="de-DE" dirty="0">
+              <a:solidFill>
+                <a:schemeClr val="tx1"/>
+              </a:solidFill>
+            </a:endParaRPr>
           </a:p>
         </p:txBody>
       </p:sp>
@@ -3614,10 +3678,453 @@
           </a:p>
         </p:txBody>
       </p:sp>
+      <p:sp>
+        <p:nvSpPr>
+          <p:cNvPr id="15" name="Abgerundetes Rechteck 14"/>
+          <p:cNvSpPr/>
+          <p:nvPr/>
+        </p:nvSpPr>
+        <p:spPr>
+          <a:xfrm>
+            <a:off x="4824249" y="2094949"/>
+            <a:ext cx="2543502" cy="599090"/>
+          </a:xfrm>
+          <a:prstGeom prst="roundRect">
+            <a:avLst/>
+          </a:prstGeom>
+          <a:solidFill>
+            <a:schemeClr val="accent6">
+              <a:lumMod val="60000"/>
+              <a:lumOff val="40000"/>
+            </a:schemeClr>
+          </a:solidFill>
+        </p:spPr>
+        <p:style>
+          <a:lnRef idx="2">
+            <a:schemeClr val="accent1">
+              <a:shade val="50000"/>
+            </a:schemeClr>
+          </a:lnRef>
+          <a:fillRef idx="1">
+            <a:schemeClr val="accent1"/>
+          </a:fillRef>
+          <a:effectRef idx="0">
+            <a:schemeClr val="accent1"/>
+          </a:effectRef>
+          <a:fontRef idx="minor">
+            <a:schemeClr val="lt1"/>
+          </a:fontRef>
+        </p:style>
+        <p:txBody>
+          <a:bodyPr rtlCol="0" anchor="ctr"/>
+          <a:lstStyle/>
+          <a:p>
+            <a:pPr algn="ctr"/>
+            <a:r>
+              <a:rPr lang="de-DE" sz="2400" dirty="0" smtClean="0">
+                <a:solidFill>
+                  <a:schemeClr val="tx1"/>
+                </a:solidFill>
+              </a:rPr>
+              <a:t>Buch hinzufügen</a:t>
+            </a:r>
+            <a:endParaRPr lang="de-DE" sz="2400" dirty="0">
+              <a:solidFill>
+                <a:schemeClr val="tx1"/>
+              </a:solidFill>
+            </a:endParaRPr>
+          </a:p>
+        </p:txBody>
+      </p:sp>
     </p:spTree>
     <p:extLst>
       <p:ext uri="{BB962C8B-B14F-4D97-AF65-F5344CB8AC3E}">
         <p14:creationId xmlns:p14="http://schemas.microsoft.com/office/powerpoint/2010/main" val="3003094754"/>
+      </p:ext>
+    </p:extLst>
+  </p:cSld>
+  <p:clrMapOvr>
+    <a:masterClrMapping/>
+  </p:clrMapOvr>
+</p:sld>
+</file>
+
+<file path=ppt/slides/slide3.xml><?xml version="1.0" encoding="utf-8"?>
+<p:sld xmlns:a="http://schemas.openxmlformats.org/drawingml/2006/main" xmlns:r="http://schemas.openxmlformats.org/officeDocument/2006/relationships" xmlns:p="http://schemas.openxmlformats.org/presentationml/2006/main">
+  <p:cSld>
+    <p:spTree>
+      <p:nvGrpSpPr>
+        <p:cNvPr id="1" name=""/>
+        <p:cNvGrpSpPr/>
+        <p:nvPr/>
+      </p:nvGrpSpPr>
+      <p:grpSpPr>
+        <a:xfrm>
+          <a:off x="0" y="0"/>
+          <a:ext cx="0" cy="0"/>
+          <a:chOff x="0" y="0"/>
+          <a:chExt cx="0" cy="0"/>
+        </a:xfrm>
+      </p:grpSpPr>
+      <p:sp>
+        <p:nvSpPr>
+          <p:cNvPr id="4" name="Textfeld 3"/>
+          <p:cNvSpPr txBox="1"/>
+          <p:nvPr/>
+        </p:nvSpPr>
+        <p:spPr>
+          <a:xfrm>
+            <a:off x="3021725" y="0"/>
+            <a:ext cx="6148551" cy="523220"/>
+          </a:xfrm>
+          <a:prstGeom prst="rect">
+            <a:avLst/>
+          </a:prstGeom>
+          <a:noFill/>
+        </p:spPr>
+        <p:txBody>
+          <a:bodyPr wrap="square" rtlCol="0">
+            <a:spAutoFit/>
+          </a:bodyPr>
+          <a:lstStyle/>
+          <a:p>
+            <a:pPr algn="ctr"/>
+            <a:r>
+              <a:rPr lang="de-DE" sz="2800" dirty="0" smtClean="0">
+                <a:latin typeface="Segoe UI" panose="020B0502040204020203" pitchFamily="34" charset="0"/>
+                <a:cs typeface="Segoe UI" panose="020B0502040204020203" pitchFamily="34" charset="0"/>
+              </a:rPr>
+              <a:t>Meine kleine Bibliothek</a:t>
+            </a:r>
+            <a:endParaRPr lang="de-DE" sz="2800" dirty="0">
+              <a:latin typeface="Segoe UI" panose="020B0502040204020203" pitchFamily="34" charset="0"/>
+              <a:cs typeface="Segoe UI" panose="020B0502040204020203" pitchFamily="34" charset="0"/>
+            </a:endParaRPr>
+          </a:p>
+        </p:txBody>
+      </p:sp>
+      <p:sp>
+        <p:nvSpPr>
+          <p:cNvPr id="14" name="Textfeld 13"/>
+          <p:cNvSpPr txBox="1"/>
+          <p:nvPr/>
+        </p:nvSpPr>
+        <p:spPr>
+          <a:xfrm>
+            <a:off x="3836276" y="6348248"/>
+            <a:ext cx="4519448" cy="369332"/>
+          </a:xfrm>
+          <a:prstGeom prst="rect">
+            <a:avLst/>
+          </a:prstGeom>
+          <a:noFill/>
+        </p:spPr>
+        <p:txBody>
+          <a:bodyPr wrap="square" rtlCol="0">
+            <a:spAutoFit/>
+          </a:bodyPr>
+          <a:lstStyle/>
+          <a:p>
+            <a:pPr algn="ctr"/>
+            <a:r>
+              <a:rPr lang="de-DE" dirty="0" smtClean="0"/>
+              <a:t>© 2022 </a:t>
+            </a:r>
+            <a:r>
+              <a:rPr lang="de-DE" dirty="0" err="1" smtClean="0"/>
+              <a:t>by</a:t>
+            </a:r>
+            <a:r>
+              <a:rPr lang="de-DE" dirty="0" smtClean="0"/>
+              <a:t> </a:t>
+            </a:r>
+            <a:r>
+              <a:rPr lang="de-DE" dirty="0" err="1" smtClean="0"/>
+              <a:t>me</a:t>
+            </a:r>
+            <a:r>
+              <a:rPr lang="de-DE" dirty="0" smtClean="0"/>
+              <a:t> :)</a:t>
+            </a:r>
+            <a:endParaRPr lang="de-DE" dirty="0"/>
+          </a:p>
+        </p:txBody>
+      </p:sp>
+      <p:sp>
+        <p:nvSpPr>
+          <p:cNvPr id="3" name="Abgerundetes Rechteck 2"/>
+          <p:cNvSpPr/>
+          <p:nvPr/>
+        </p:nvSpPr>
+        <p:spPr>
+          <a:xfrm>
+            <a:off x="788276" y="1145628"/>
+            <a:ext cx="4014952" cy="441434"/>
+          </a:xfrm>
+          <a:prstGeom prst="roundRect">
+            <a:avLst/>
+          </a:prstGeom>
+          <a:solidFill>
+            <a:srgbClr val="9AC2E6"/>
+          </a:solidFill>
+          <a:ln>
+            <a:noFill/>
+          </a:ln>
+        </p:spPr>
+        <p:style>
+          <a:lnRef idx="2">
+            <a:schemeClr val="accent1">
+              <a:shade val="50000"/>
+            </a:schemeClr>
+          </a:lnRef>
+          <a:fillRef idx="1">
+            <a:schemeClr val="accent1"/>
+          </a:fillRef>
+          <a:effectRef idx="0">
+            <a:schemeClr val="accent1"/>
+          </a:effectRef>
+          <a:fontRef idx="minor">
+            <a:schemeClr val="lt1"/>
+          </a:fontRef>
+        </p:style>
+        <p:txBody>
+          <a:bodyPr rtlCol="0" anchor="ctr"/>
+          <a:lstStyle/>
+          <a:p>
+            <a:r>
+              <a:rPr lang="de-DE" sz="2000" dirty="0">
+                <a:solidFill>
+                  <a:schemeClr val="tx1"/>
+                </a:solidFill>
+              </a:rPr>
+              <a:t>Buchtitel</a:t>
+            </a:r>
+          </a:p>
+        </p:txBody>
+      </p:sp>
+      <p:sp>
+        <p:nvSpPr>
+          <p:cNvPr id="5" name="Rechteck 4"/>
+          <p:cNvSpPr/>
+          <p:nvPr/>
+        </p:nvSpPr>
+        <p:spPr>
+          <a:xfrm>
+            <a:off x="788276" y="1723697"/>
+            <a:ext cx="4025462" cy="441434"/>
+          </a:xfrm>
+          <a:prstGeom prst="rect">
+            <a:avLst/>
+          </a:prstGeom>
+          <a:solidFill>
+            <a:schemeClr val="bg1"/>
+          </a:solidFill>
+        </p:spPr>
+        <p:style>
+          <a:lnRef idx="2">
+            <a:schemeClr val="accent1">
+              <a:shade val="50000"/>
+            </a:schemeClr>
+          </a:lnRef>
+          <a:fillRef idx="1">
+            <a:schemeClr val="accent1"/>
+          </a:fillRef>
+          <a:effectRef idx="0">
+            <a:schemeClr val="accent1"/>
+          </a:effectRef>
+          <a:fontRef idx="minor">
+            <a:schemeClr val="lt1"/>
+          </a:fontRef>
+        </p:style>
+        <p:txBody>
+          <a:bodyPr rtlCol="0" anchor="ctr"/>
+          <a:lstStyle/>
+          <a:p>
+            <a:r>
+              <a:rPr lang="de-DE" dirty="0" smtClean="0">
+                <a:solidFill>
+                  <a:schemeClr val="tx1"/>
+                </a:solidFill>
+              </a:rPr>
+              <a:t>Verfügbar</a:t>
+            </a:r>
+            <a:endParaRPr lang="de-DE" dirty="0">
+              <a:solidFill>
+                <a:schemeClr val="tx1"/>
+              </a:solidFill>
+            </a:endParaRPr>
+          </a:p>
+        </p:txBody>
+      </p:sp>
+      <p:sp>
+        <p:nvSpPr>
+          <p:cNvPr id="17" name="Gleichschenkliges Dreieck 16"/>
+          <p:cNvSpPr/>
+          <p:nvPr/>
+        </p:nvSpPr>
+        <p:spPr>
+          <a:xfrm rot="10800000">
+            <a:off x="4267199" y="1807777"/>
+            <a:ext cx="462456" cy="300542"/>
+          </a:xfrm>
+          <a:prstGeom prst="triangle">
+            <a:avLst/>
+          </a:prstGeom>
+          <a:solidFill>
+            <a:schemeClr val="tx1"/>
+          </a:solidFill>
+          <a:ln>
+            <a:noFill/>
+          </a:ln>
+        </p:spPr>
+        <p:style>
+          <a:lnRef idx="2">
+            <a:schemeClr val="accent1">
+              <a:shade val="50000"/>
+            </a:schemeClr>
+          </a:lnRef>
+          <a:fillRef idx="1">
+            <a:schemeClr val="accent1"/>
+          </a:fillRef>
+          <a:effectRef idx="0">
+            <a:schemeClr val="accent1"/>
+          </a:effectRef>
+          <a:fontRef idx="minor">
+            <a:schemeClr val="lt1"/>
+          </a:fontRef>
+        </p:style>
+        <p:txBody>
+          <a:bodyPr rtlCol="0" anchor="ctr"/>
+          <a:lstStyle/>
+          <a:p>
+            <a:pPr algn="ctr"/>
+            <a:endParaRPr lang="de-DE"/>
+          </a:p>
+        </p:txBody>
+      </p:sp>
+      <p:sp>
+        <p:nvSpPr>
+          <p:cNvPr id="18" name="Abgerundetes Rechteck 17"/>
+          <p:cNvSpPr/>
+          <p:nvPr/>
+        </p:nvSpPr>
+        <p:spPr>
+          <a:xfrm>
+            <a:off x="2995449" y="2442658"/>
+            <a:ext cx="1818289" cy="365262"/>
+          </a:xfrm>
+          <a:prstGeom prst="roundRect">
+            <a:avLst/>
+          </a:prstGeom>
+          <a:solidFill>
+            <a:schemeClr val="accent6">
+              <a:lumMod val="60000"/>
+              <a:lumOff val="40000"/>
+            </a:schemeClr>
+          </a:solidFill>
+          <a:ln>
+            <a:noFill/>
+          </a:ln>
+        </p:spPr>
+        <p:style>
+          <a:lnRef idx="2">
+            <a:schemeClr val="accent1">
+              <a:shade val="50000"/>
+            </a:schemeClr>
+          </a:lnRef>
+          <a:fillRef idx="1">
+            <a:schemeClr val="accent1"/>
+          </a:fillRef>
+          <a:effectRef idx="0">
+            <a:schemeClr val="accent1"/>
+          </a:effectRef>
+          <a:fontRef idx="minor">
+            <a:schemeClr val="lt1"/>
+          </a:fontRef>
+        </p:style>
+        <p:txBody>
+          <a:bodyPr rtlCol="0" anchor="ctr"/>
+          <a:lstStyle/>
+          <a:p>
+            <a:pPr algn="ctr"/>
+            <a:r>
+              <a:rPr lang="de-DE" dirty="0" smtClean="0">
+                <a:solidFill>
+                  <a:schemeClr val="tx1"/>
+                </a:solidFill>
+              </a:rPr>
+              <a:t>Buch speichern</a:t>
+            </a:r>
+            <a:endParaRPr lang="de-DE" dirty="0">
+              <a:solidFill>
+                <a:schemeClr val="tx1"/>
+              </a:solidFill>
+            </a:endParaRPr>
+          </a:p>
+        </p:txBody>
+      </p:sp>
+      <p:sp>
+        <p:nvSpPr>
+          <p:cNvPr id="19" name="Abgerundetes Rechteck 18"/>
+          <p:cNvSpPr/>
+          <p:nvPr/>
+        </p:nvSpPr>
+        <p:spPr>
+          <a:xfrm>
+            <a:off x="788276" y="2422277"/>
+            <a:ext cx="1818289" cy="365262"/>
+          </a:xfrm>
+          <a:prstGeom prst="roundRect">
+            <a:avLst/>
+          </a:prstGeom>
+          <a:solidFill>
+            <a:srgbClr val="FF6161"/>
+          </a:solidFill>
+          <a:ln>
+            <a:noFill/>
+          </a:ln>
+        </p:spPr>
+        <p:style>
+          <a:lnRef idx="2">
+            <a:schemeClr val="accent1">
+              <a:shade val="50000"/>
+            </a:schemeClr>
+          </a:lnRef>
+          <a:fillRef idx="1">
+            <a:schemeClr val="accent1"/>
+          </a:fillRef>
+          <a:effectRef idx="0">
+            <a:schemeClr val="accent1"/>
+          </a:effectRef>
+          <a:fontRef idx="minor">
+            <a:schemeClr val="lt1"/>
+          </a:fontRef>
+        </p:style>
+        <p:txBody>
+          <a:bodyPr rtlCol="0" anchor="ctr"/>
+          <a:lstStyle/>
+          <a:p>
+            <a:pPr algn="ctr"/>
+            <a:r>
+              <a:rPr lang="de-DE" dirty="0" smtClean="0">
+                <a:solidFill>
+                  <a:schemeClr val="tx1"/>
+                </a:solidFill>
+              </a:rPr>
+              <a:t>Abbrechen</a:t>
+            </a:r>
+            <a:endParaRPr lang="de-DE" dirty="0">
+              <a:solidFill>
+                <a:schemeClr val="tx1"/>
+              </a:solidFill>
+            </a:endParaRPr>
+          </a:p>
+        </p:txBody>
+      </p:sp>
+    </p:spTree>
+    <p:extLst>
+      <p:ext uri="{BB962C8B-B14F-4D97-AF65-F5344CB8AC3E}">
+        <p14:creationId xmlns:p14="http://schemas.microsoft.com/office/powerpoint/2010/main" val="3133615463"/>
       </p:ext>
     </p:extLst>
   </p:cSld>

</xml_diff>